<commit_message>
Update slides and demo notes for metrics
</commit_message>
<xml_diff>
--- a/whats-new-cloud-native-dev-dotnet8/slide_deck.pptx
+++ b/whats-new-cloud-native-dev-dotnet8/slide_deck.pptx
@@ -5,7 +5,7 @@
     <p:sldMasterId id="2147483648" r:id="rId1"/>
   </p:sldMasterIdLst>
   <p:notesMasterIdLst>
-    <p:notesMasterId r:id="rId18"/>
+    <p:notesMasterId r:id="rId20"/>
   </p:notesMasterIdLst>
   <p:sldIdLst>
     <p:sldId id="256" r:id="rId2"/>
@@ -22,8 +22,10 @@
     <p:sldId id="272" r:id="rId13"/>
     <p:sldId id="271" r:id="rId14"/>
     <p:sldId id="261" r:id="rId15"/>
-    <p:sldId id="260" r:id="rId16"/>
-    <p:sldId id="259" r:id="rId17"/>
+    <p:sldId id="273" r:id="rId16"/>
+    <p:sldId id="274" r:id="rId17"/>
+    <p:sldId id="260" r:id="rId18"/>
+    <p:sldId id="259" r:id="rId19"/>
   </p:sldIdLst>
   <p:sldSz cx="12192000" cy="6858000"/>
   <p:notesSz cx="6858000" cy="9144000"/>
@@ -153,6 +155,8 @@
         <p14:section name="Open Telemetry" id="{48B0B115-B9DF-4647-AD04-F084920AEB36}">
           <p14:sldIdLst>
             <p14:sldId id="261"/>
+            <p14:sldId id="273"/>
+            <p14:sldId id="274"/>
           </p14:sldIdLst>
         </p14:section>
         <p14:section name=".NET Aspire" id="{1E2FD5A5-DEB1-4AAC-9598-5DFD0590E05E}">
@@ -5354,9 +5358,8 @@
           <a:p>
             <a:r>
               <a:rPr lang="en-GB" dirty="0"/>
-              <a:t>Open Telemetry Improvements</a:t>
-            </a:r>
-            <a:endParaRPr lang="en-AU" dirty="0"/>
+              <a:t>New metrics in ASP.NET Core</a:t>
+            </a:r>
           </a:p>
         </p:txBody>
       </p:sp>
@@ -5420,6 +5423,217 @@
           <p:cNvPr id="4" name="Title 3">
             <a:extLst>
               <a:ext uri="{FF2B5EF4-FFF2-40B4-BE49-F238E27FC236}">
+                <a16:creationId xmlns:a16="http://schemas.microsoft.com/office/drawing/2014/main" id="{245154A3-E20E-E8DD-EA18-AA2C20916E08}"/>
+              </a:ext>
+            </a:extLst>
+          </p:cNvPr>
+          <p:cNvSpPr>
+            <a:spLocks noGrp="1"/>
+          </p:cNvSpPr>
+          <p:nvPr>
+            <p:ph type="title"/>
+          </p:nvPr>
+        </p:nvSpPr>
+        <p:spPr/>
+        <p:txBody>
+          <a:bodyPr/>
+          <a:lstStyle/>
+          <a:p>
+            <a:r>
+              <a:rPr lang="en-NZ" dirty="0" err="1"/>
+              <a:t>System.Diagnostics.Metrics</a:t>
+            </a:r>
+            <a:endParaRPr lang="en-NZ" dirty="0"/>
+          </a:p>
+        </p:txBody>
+      </p:sp>
+      <p:sp>
+        <p:nvSpPr>
+          <p:cNvPr id="5" name="Content Placeholder 4">
+            <a:extLst>
+              <a:ext uri="{FF2B5EF4-FFF2-40B4-BE49-F238E27FC236}">
+                <a16:creationId xmlns:a16="http://schemas.microsoft.com/office/drawing/2014/main" id="{93C1D270-49FE-79F3-8AA6-0251BDDCE78C}"/>
+              </a:ext>
+            </a:extLst>
+          </p:cNvPr>
+          <p:cNvSpPr>
+            <a:spLocks noGrp="1"/>
+          </p:cNvSpPr>
+          <p:nvPr>
+            <p:ph idx="1"/>
+          </p:nvPr>
+        </p:nvSpPr>
+        <p:spPr/>
+        <p:txBody>
+          <a:bodyPr/>
+          <a:lstStyle/>
+          <a:p>
+            <a:r>
+              <a:rPr lang="en-NZ" dirty="0"/>
+              <a:t>ASP.NET Core now provides runtime metrics through </a:t>
+            </a:r>
+            <a:r>
+              <a:rPr lang="en-NZ" dirty="0" err="1"/>
+              <a:t>System.Diagnostics.Metrics</a:t>
+            </a:r>
+            <a:r>
+              <a:rPr lang="en-NZ" dirty="0"/>
+              <a:t>.</a:t>
+            </a:r>
+          </a:p>
+          <a:p>
+            <a:r>
+              <a:rPr lang="en-NZ" dirty="0"/>
+              <a:t>Designed in collaboration with OpenTelemetry Community.</a:t>
+            </a:r>
+          </a:p>
+          <a:p>
+            <a:r>
+              <a:rPr lang="en-NZ" dirty="0"/>
+              <a:t>Metrics offer improvements, such as:</a:t>
+            </a:r>
+          </a:p>
+          <a:p>
+            <a:pPr lvl="1"/>
+            <a:r>
+              <a:rPr lang="en-NZ" dirty="0"/>
+              <a:t>New counters, gauges, and histograms.</a:t>
+            </a:r>
+          </a:p>
+          <a:p>
+            <a:pPr lvl="1"/>
+            <a:r>
+              <a:rPr lang="en-NZ" dirty="0"/>
+              <a:t>Reporting with multi-dimensional values.</a:t>
+            </a:r>
+          </a:p>
+          <a:p>
+            <a:pPr lvl="1"/>
+            <a:r>
+              <a:rPr lang="en-NZ" dirty="0"/>
+              <a:t>Integration with wider cloud native ecosystem by aligning to OpenTelemetry standards.</a:t>
+            </a:r>
+          </a:p>
+        </p:txBody>
+      </p:sp>
+    </p:spTree>
+    <p:extLst>
+      <p:ext uri="{BB962C8B-B14F-4D97-AF65-F5344CB8AC3E}">
+        <p14:creationId xmlns:p14="http://schemas.microsoft.com/office/powerpoint/2010/main" val="484744134"/>
+      </p:ext>
+    </p:extLst>
+  </p:cSld>
+  <p:clrMapOvr>
+    <a:masterClrMapping/>
+  </p:clrMapOvr>
+</p:sld>
+</file>
+
+<file path=ppt/slides/slide16.xml><?xml version="1.0" encoding="utf-8"?>
+<p:sld xmlns:a="http://schemas.openxmlformats.org/drawingml/2006/main" xmlns:r="http://schemas.openxmlformats.org/officeDocument/2006/relationships" xmlns:p="http://schemas.openxmlformats.org/presentationml/2006/main">
+  <p:cSld>
+    <p:spTree>
+      <p:nvGrpSpPr>
+        <p:cNvPr id="1" name=""/>
+        <p:cNvGrpSpPr/>
+        <p:nvPr/>
+      </p:nvGrpSpPr>
+      <p:grpSpPr>
+        <a:xfrm>
+          <a:off x="0" y="0"/>
+          <a:ext cx="0" cy="0"/>
+          <a:chOff x="0" y="0"/>
+          <a:chExt cx="0" cy="0"/>
+        </a:xfrm>
+      </p:grpSpPr>
+      <p:sp>
+        <p:nvSpPr>
+          <p:cNvPr id="4" name="Title 3">
+            <a:extLst>
+              <a:ext uri="{FF2B5EF4-FFF2-40B4-BE49-F238E27FC236}">
+                <a16:creationId xmlns:a16="http://schemas.microsoft.com/office/drawing/2014/main" id="{778C75F7-737E-36CE-EA7B-379EFA669552}"/>
+              </a:ext>
+            </a:extLst>
+          </p:cNvPr>
+          <p:cNvSpPr>
+            <a:spLocks noGrp="1"/>
+          </p:cNvSpPr>
+          <p:nvPr>
+            <p:ph type="title"/>
+          </p:nvPr>
+        </p:nvSpPr>
+        <p:spPr/>
+        <p:txBody>
+          <a:bodyPr/>
+          <a:lstStyle/>
+          <a:p>
+            <a:r>
+              <a:rPr lang="en-NZ" dirty="0"/>
+              <a:t>Metrics Demo</a:t>
+            </a:r>
+          </a:p>
+        </p:txBody>
+      </p:sp>
+      <p:sp>
+        <p:nvSpPr>
+          <p:cNvPr id="5" name="Text Placeholder 4">
+            <a:extLst>
+              <a:ext uri="{FF2B5EF4-FFF2-40B4-BE49-F238E27FC236}">
+                <a16:creationId xmlns:a16="http://schemas.microsoft.com/office/drawing/2014/main" id="{52907351-17D6-2321-7964-95761955CBD4}"/>
+              </a:ext>
+            </a:extLst>
+          </p:cNvPr>
+          <p:cNvSpPr>
+            <a:spLocks noGrp="1"/>
+          </p:cNvSpPr>
+          <p:nvPr>
+            <p:ph type="body" idx="1"/>
+          </p:nvPr>
+        </p:nvSpPr>
+        <p:spPr/>
+        <p:txBody>
+          <a:bodyPr/>
+          <a:lstStyle/>
+          <a:p>
+            <a:endParaRPr lang="en-NZ"/>
+          </a:p>
+        </p:txBody>
+      </p:sp>
+    </p:spTree>
+    <p:extLst>
+      <p:ext uri="{BB962C8B-B14F-4D97-AF65-F5344CB8AC3E}">
+        <p14:creationId xmlns:p14="http://schemas.microsoft.com/office/powerpoint/2010/main" val="3255049392"/>
+      </p:ext>
+    </p:extLst>
+  </p:cSld>
+  <p:clrMapOvr>
+    <a:masterClrMapping/>
+  </p:clrMapOvr>
+</p:sld>
+</file>
+
+<file path=ppt/slides/slide17.xml><?xml version="1.0" encoding="utf-8"?>
+<p:sld xmlns:a="http://schemas.openxmlformats.org/drawingml/2006/main" xmlns:r="http://schemas.openxmlformats.org/officeDocument/2006/relationships" xmlns:p="http://schemas.openxmlformats.org/presentationml/2006/main">
+  <p:cSld>
+    <p:spTree>
+      <p:nvGrpSpPr>
+        <p:cNvPr id="1" name=""/>
+        <p:cNvGrpSpPr/>
+        <p:nvPr/>
+      </p:nvGrpSpPr>
+      <p:grpSpPr>
+        <a:xfrm>
+          <a:off x="0" y="0"/>
+          <a:ext cx="0" cy="0"/>
+          <a:chOff x="0" y="0"/>
+          <a:chExt cx="0" cy="0"/>
+        </a:xfrm>
+      </p:grpSpPr>
+      <p:sp>
+        <p:nvSpPr>
+          <p:cNvPr id="4" name="Title 3">
+            <a:extLst>
+              <a:ext uri="{FF2B5EF4-FFF2-40B4-BE49-F238E27FC236}">
                 <a16:creationId xmlns:a16="http://schemas.microsoft.com/office/drawing/2014/main" id="{AA1C4710-A126-C372-A67C-F36740142F95}"/>
               </a:ext>
             </a:extLst>
@@ -5482,7 +5696,7 @@
 </p:sld>
 </file>
 
-<file path=ppt/slides/slide16.xml><?xml version="1.0" encoding="utf-8"?>
+<file path=ppt/slides/slide18.xml><?xml version="1.0" encoding="utf-8"?>
 <p:sld xmlns:a="http://schemas.openxmlformats.org/drawingml/2006/main" xmlns:r="http://schemas.openxmlformats.org/officeDocument/2006/relationships" xmlns:p="http://schemas.openxmlformats.org/presentationml/2006/main">
   <p:cSld>
     <p:spTree>
@@ -5799,7 +6013,7 @@
           <a:p>
             <a:r>
               <a:rPr lang="en-GB" dirty="0"/>
-              <a:t>Open Telemetry improvements</a:t>
+              <a:t>New metrics in ASP.NET Core</a:t>
             </a:r>
           </a:p>
           <a:p>

</xml_diff>

<commit_message>
Final demo and slides for whats-new-cloud-native-dev-dotnet8
</commit_message>
<xml_diff>
--- a/whats-new-cloud-native-dev-dotnet8/slide_deck.pptx
+++ b/whats-new-cloud-native-dev-dotnet8/slide_deck.pptx
@@ -2,7 +2,7 @@
 <file path=ppt/presentation.xml><?xml version="1.0" encoding="utf-8"?>
 <p:presentation xmlns:a="http://schemas.openxmlformats.org/drawingml/2006/main" xmlns:r="http://schemas.openxmlformats.org/officeDocument/2006/relationships" xmlns:p="http://schemas.openxmlformats.org/presentationml/2006/main" saveSubsetFonts="1">
   <p:sldMasterIdLst>
-    <p:sldMasterId id="2147483768" r:id="rId1"/>
+    <p:sldMasterId id="2147483900" r:id="rId1"/>
   </p:sldMasterIdLst>
   <p:notesMasterIdLst>
     <p:notesMasterId r:id="rId28"/>
@@ -2430,8 +2430,8 @@
       </dsp:nvSpPr>
       <dsp:spPr>
         <a:xfrm rot="10800000">
-          <a:off x="1716861" y="1114"/>
-          <a:ext cx="5869063" cy="954252"/>
+          <a:off x="1716715" y="1235"/>
+          <a:ext cx="5868567" cy="954172"/>
         </a:xfrm>
         <a:prstGeom prst="homePlate">
           <a:avLst/>
@@ -2472,7 +2472,7 @@
         </a:fontRef>
       </dsp:style>
       <dsp:txBody>
-        <a:bodyPr spcFirstLastPara="0" vert="horz" wrap="square" lIns="420799" tIns="129540" rIns="241808" bIns="129540" numCol="1" spcCol="1270" anchor="ctr" anchorCtr="0">
+        <a:bodyPr spcFirstLastPara="0" vert="horz" wrap="square" lIns="420763" tIns="129540" rIns="241808" bIns="129540" numCol="1" spcCol="1270" anchor="ctr" anchorCtr="0">
           <a:noAutofit/>
         </a:bodyPr>
         <a:lstStyle/>
@@ -2497,8 +2497,8 @@
         </a:p>
       </dsp:txBody>
       <dsp:txXfrm rot="10800000">
-        <a:off x="1955424" y="1114"/>
-        <a:ext cx="5630500" cy="954252"/>
+        <a:off x="1955258" y="1235"/>
+        <a:ext cx="5630024" cy="954172"/>
       </dsp:txXfrm>
     </dsp:sp>
     <dsp:sp modelId="{3ABA2712-2F4F-42A6-90A0-148FF652CB18}">
@@ -2508,8 +2508,8 @@
       </dsp:nvSpPr>
       <dsp:spPr>
         <a:xfrm>
-          <a:off x="1239734" y="1114"/>
-          <a:ext cx="954252" cy="954252"/>
+          <a:off x="1239629" y="1235"/>
+          <a:ext cx="954172" cy="954172"/>
         </a:xfrm>
         <a:prstGeom prst="ellipse">
           <a:avLst/>
@@ -2563,8 +2563,8 @@
       </dsp:nvSpPr>
       <dsp:spPr>
         <a:xfrm rot="10800000">
-          <a:off x="1716861" y="1231023"/>
-          <a:ext cx="5869063" cy="954252"/>
+          <a:off x="1716715" y="1231063"/>
+          <a:ext cx="5868567" cy="954172"/>
         </a:xfrm>
         <a:prstGeom prst="homePlate">
           <a:avLst/>
@@ -2605,7 +2605,7 @@
         </a:fontRef>
       </dsp:style>
       <dsp:txBody>
-        <a:bodyPr spcFirstLastPara="0" vert="horz" wrap="square" lIns="420799" tIns="129540" rIns="241808" bIns="129540" numCol="1" spcCol="1270" anchor="ctr" anchorCtr="0">
+        <a:bodyPr spcFirstLastPara="0" vert="horz" wrap="square" lIns="420763" tIns="129540" rIns="241808" bIns="129540" numCol="1" spcCol="1270" anchor="ctr" anchorCtr="0">
           <a:noAutofit/>
         </a:bodyPr>
         <a:lstStyle/>
@@ -2630,8 +2630,8 @@
         </a:p>
       </dsp:txBody>
       <dsp:txXfrm rot="10800000">
-        <a:off x="1955424" y="1231023"/>
-        <a:ext cx="5630500" cy="954252"/>
+        <a:off x="1955258" y="1231063"/>
+        <a:ext cx="5630024" cy="954172"/>
       </dsp:txXfrm>
     </dsp:sp>
     <dsp:sp modelId="{2F4AD194-A574-4357-9931-974A0B6026D1}">
@@ -2641,8 +2641,8 @@
       </dsp:nvSpPr>
       <dsp:spPr>
         <a:xfrm>
-          <a:off x="1239734" y="1231023"/>
-          <a:ext cx="954252" cy="954252"/>
+          <a:off x="1239629" y="1231063"/>
+          <a:ext cx="954172" cy="954172"/>
         </a:xfrm>
         <a:prstGeom prst="ellipse">
           <a:avLst/>
@@ -2696,8 +2696,8 @@
       </dsp:nvSpPr>
       <dsp:spPr>
         <a:xfrm rot="10800000">
-          <a:off x="1716861" y="2460932"/>
-          <a:ext cx="5869063" cy="954252"/>
+          <a:off x="1716715" y="2460892"/>
+          <a:ext cx="5868567" cy="954172"/>
         </a:xfrm>
         <a:prstGeom prst="homePlate">
           <a:avLst/>
@@ -2738,7 +2738,7 @@
         </a:fontRef>
       </dsp:style>
       <dsp:txBody>
-        <a:bodyPr spcFirstLastPara="0" vert="horz" wrap="square" lIns="420799" tIns="129540" rIns="241808" bIns="129540" numCol="1" spcCol="1270" anchor="ctr" anchorCtr="0">
+        <a:bodyPr spcFirstLastPara="0" vert="horz" wrap="square" lIns="420763" tIns="129540" rIns="241808" bIns="129540" numCol="1" spcCol="1270" anchor="ctr" anchorCtr="0">
           <a:noAutofit/>
         </a:bodyPr>
         <a:lstStyle/>
@@ -2763,8 +2763,8 @@
         </a:p>
       </dsp:txBody>
       <dsp:txXfrm rot="10800000">
-        <a:off x="1955424" y="2460932"/>
-        <a:ext cx="5630500" cy="954252"/>
+        <a:off x="1955258" y="2460892"/>
+        <a:ext cx="5630024" cy="954172"/>
       </dsp:txXfrm>
     </dsp:sp>
     <dsp:sp modelId="{80504092-3F37-4086-A3AB-B04556B5BB17}">
@@ -2774,8 +2774,8 @@
       </dsp:nvSpPr>
       <dsp:spPr>
         <a:xfrm>
-          <a:off x="1239734" y="2460932"/>
-          <a:ext cx="954252" cy="954252"/>
+          <a:off x="1239629" y="2460892"/>
+          <a:ext cx="954172" cy="954172"/>
         </a:xfrm>
         <a:prstGeom prst="ellipse">
           <a:avLst/>
@@ -6345,6 +6345,195 @@
 </p:notes>
 </file>
 
+<file path=ppt/notesSlides/notesSlide9.xml><?xml version="1.0" encoding="utf-8"?>
+<p:notes xmlns:a="http://schemas.openxmlformats.org/drawingml/2006/main" xmlns:r="http://schemas.openxmlformats.org/officeDocument/2006/relationships" xmlns:p="http://schemas.openxmlformats.org/presentationml/2006/main">
+  <p:cSld>
+    <p:spTree>
+      <p:nvGrpSpPr>
+        <p:cNvPr id="1" name=""/>
+        <p:cNvGrpSpPr/>
+        <p:nvPr/>
+      </p:nvGrpSpPr>
+      <p:grpSpPr>
+        <a:xfrm>
+          <a:off x="0" y="0"/>
+          <a:ext cx="0" cy="0"/>
+          <a:chOff x="0" y="0"/>
+          <a:chExt cx="0" cy="0"/>
+        </a:xfrm>
+      </p:grpSpPr>
+      <p:sp>
+        <p:nvSpPr>
+          <p:cNvPr id="2" name="Slide Image Placeholder 1"/>
+          <p:cNvSpPr>
+            <a:spLocks noGrp="1" noRot="1" noChangeAspect="1"/>
+          </p:cNvSpPr>
+          <p:nvPr>
+            <p:ph type="sldImg"/>
+          </p:nvPr>
+        </p:nvSpPr>
+        <p:spPr/>
+      </p:sp>
+      <p:sp>
+        <p:nvSpPr>
+          <p:cNvPr id="3" name="Notes Placeholder 2"/>
+          <p:cNvSpPr>
+            <a:spLocks noGrp="1"/>
+          </p:cNvSpPr>
+          <p:nvPr>
+            <p:ph type="body" idx="1"/>
+          </p:nvPr>
+        </p:nvSpPr>
+        <p:spPr/>
+        <p:txBody>
+          <a:bodyPr/>
+          <a:lstStyle/>
+          <a:p>
+            <a:r>
+              <a:rPr lang="en-NZ" dirty="0" err="1"/>
+              <a:t>System.Diagnotics.Metrics</a:t>
+            </a:r>
+            <a:r>
+              <a:rPr lang="en-NZ" dirty="0"/>
+              <a:t> APIs are the newest cross-platform APIs, and Microsoft worked with OpenTelemetry project to design them.</a:t>
+            </a:r>
+          </a:p>
+          <a:p>
+            <a:r>
+              <a:rPr lang="en-NZ" dirty="0"/>
+              <a:t>It’s available for .NET 6+, and the API add support for things such as:</a:t>
+            </a:r>
+          </a:p>
+          <a:p>
+            <a:endParaRPr lang="en-NZ" dirty="0"/>
+          </a:p>
+          <a:p>
+            <a:pPr algn="l">
+              <a:buFont typeface="Arial" panose="020B0604020202020204" pitchFamily="34" charset="0"/>
+              <a:buChar char="•"/>
+            </a:pPr>
+            <a:r>
+              <a:rPr lang="en-GB" b="0" i="0" dirty="0">
+                <a:solidFill>
+                  <a:srgbClr val="E6E6E6"/>
+                </a:solidFill>
+                <a:effectLst/>
+                <a:latin typeface="Segoe UI" panose="020B0502040204020203" pitchFamily="34" charset="0"/>
+              </a:rPr>
+              <a:t>Histograms and percentiles</a:t>
+            </a:r>
+          </a:p>
+          <a:p>
+            <a:pPr algn="l">
+              <a:buFont typeface="Arial" panose="020B0604020202020204" pitchFamily="34" charset="0"/>
+              <a:buChar char="•"/>
+            </a:pPr>
+            <a:r>
+              <a:rPr lang="en-GB" b="0" i="0" dirty="0">
+                <a:solidFill>
+                  <a:srgbClr val="E6E6E6"/>
+                </a:solidFill>
+                <a:effectLst/>
+                <a:latin typeface="Segoe UI" panose="020B0502040204020203" pitchFamily="34" charset="0"/>
+              </a:rPr>
+              <a:t>Multi-dimensional metrics</a:t>
+            </a:r>
+          </a:p>
+          <a:p>
+            <a:pPr algn="l">
+              <a:buFont typeface="Arial" panose="020B0604020202020204" pitchFamily="34" charset="0"/>
+              <a:buChar char="•"/>
+            </a:pPr>
+            <a:r>
+              <a:rPr lang="en-GB" b="0" i="0" dirty="0">
+                <a:solidFill>
+                  <a:srgbClr val="E6E6E6"/>
+                </a:solidFill>
+                <a:effectLst/>
+                <a:latin typeface="Segoe UI" panose="020B0502040204020203" pitchFamily="34" charset="0"/>
+              </a:rPr>
+              <a:t>Strongly typed high-performance listener API</a:t>
+            </a:r>
+          </a:p>
+          <a:p>
+            <a:pPr algn="l">
+              <a:buFont typeface="Arial" panose="020B0604020202020204" pitchFamily="34" charset="0"/>
+              <a:buChar char="•"/>
+            </a:pPr>
+            <a:r>
+              <a:rPr lang="en-GB" b="0" i="0" dirty="0">
+                <a:solidFill>
+                  <a:srgbClr val="E6E6E6"/>
+                </a:solidFill>
+                <a:effectLst/>
+                <a:latin typeface="Segoe UI" panose="020B0502040204020203" pitchFamily="34" charset="0"/>
+              </a:rPr>
+              <a:t>Multiple simultaneous listeners</a:t>
+            </a:r>
+          </a:p>
+          <a:p>
+            <a:pPr algn="l">
+              <a:buFont typeface="Arial" panose="020B0604020202020204" pitchFamily="34" charset="0"/>
+              <a:buChar char="•"/>
+            </a:pPr>
+            <a:r>
+              <a:rPr lang="en-GB" b="0" i="0" dirty="0">
+                <a:solidFill>
+                  <a:srgbClr val="E6E6E6"/>
+                </a:solidFill>
+                <a:effectLst/>
+                <a:latin typeface="Segoe UI" panose="020B0502040204020203" pitchFamily="34" charset="0"/>
+              </a:rPr>
+              <a:t>Listener access to unaggregated measurements</a:t>
+            </a:r>
+          </a:p>
+          <a:p>
+            <a:endParaRPr lang="en-NZ" dirty="0"/>
+          </a:p>
+          <a:p>
+            <a:r>
+              <a:rPr lang="en-NZ" dirty="0"/>
+              <a:t>Although the API was designed with OpenTelemetry in mind, it can work with .NET built in listener APIs directly.</a:t>
+            </a:r>
+          </a:p>
+        </p:txBody>
+      </p:sp>
+      <p:sp>
+        <p:nvSpPr>
+          <p:cNvPr id="4" name="Slide Number Placeholder 3"/>
+          <p:cNvSpPr>
+            <a:spLocks noGrp="1"/>
+          </p:cNvSpPr>
+          <p:nvPr>
+            <p:ph type="sldNum" sz="quarter" idx="5"/>
+          </p:nvPr>
+        </p:nvSpPr>
+        <p:spPr/>
+        <p:txBody>
+          <a:bodyPr/>
+          <a:lstStyle/>
+          <a:p>
+            <a:fld id="{360642DD-F651-47DC-B7D5-5290C747C85D}" type="slidenum">
+              <a:rPr lang="en-NZ" smtClean="0"/>
+              <a:t>15</a:t>
+            </a:fld>
+            <a:endParaRPr lang="en-NZ"/>
+          </a:p>
+        </p:txBody>
+      </p:sp>
+    </p:spTree>
+    <p:extLst>
+      <p:ext uri="{BB962C8B-B14F-4D97-AF65-F5344CB8AC3E}">
+        <p14:creationId xmlns:p14="http://schemas.microsoft.com/office/powerpoint/2010/main" val="2198279014"/>
+      </p:ext>
+    </p:extLst>
+  </p:cSld>
+  <p:clrMapOvr>
+    <a:masterClrMapping/>
+  </p:clrMapOvr>
+</p:notes>
+</file>
+
 <file path=ppt/slideLayouts/slideLayout1.xml><?xml version="1.0" encoding="utf-8"?>
 <p:sldLayout xmlns:a="http://schemas.openxmlformats.org/drawingml/2006/main" xmlns:r="http://schemas.openxmlformats.org/officeDocument/2006/relationships" xmlns:p="http://schemas.openxmlformats.org/presentationml/2006/main" showMasterSp="0" type="title" preserve="1">
   <p:cSld name="Title Slide">
@@ -6787,7 +6976,7 @@
     </p:spTree>
     <p:extLst>
       <p:ext uri="{BB962C8B-B14F-4D97-AF65-F5344CB8AC3E}">
-        <p14:creationId xmlns:p14="http://schemas.microsoft.com/office/powerpoint/2010/main" val="3619261331"/>
+        <p14:creationId xmlns:p14="http://schemas.microsoft.com/office/powerpoint/2010/main" val="4195536038"/>
       </p:ext>
     </p:extLst>
   </p:cSld>
@@ -7855,7 +8044,7 @@
     </p:spTree>
     <p:extLst>
       <p:ext uri="{BB962C8B-B14F-4D97-AF65-F5344CB8AC3E}">
-        <p14:creationId xmlns:p14="http://schemas.microsoft.com/office/powerpoint/2010/main" val="2624775374"/>
+        <p14:creationId xmlns:p14="http://schemas.microsoft.com/office/powerpoint/2010/main" val="1871317680"/>
       </p:ext>
     </p:extLst>
   </p:cSld>
@@ -8835,7 +9024,7 @@
     </p:spTree>
     <p:extLst>
       <p:ext uri="{BB962C8B-B14F-4D97-AF65-F5344CB8AC3E}">
-        <p14:creationId xmlns:p14="http://schemas.microsoft.com/office/powerpoint/2010/main" val="1606127091"/>
+        <p14:creationId xmlns:p14="http://schemas.microsoft.com/office/powerpoint/2010/main" val="1482350872"/>
       </p:ext>
     </p:extLst>
   </p:cSld>
@@ -9969,7 +10158,7 @@
     </p:spTree>
     <p:extLst>
       <p:ext uri="{BB962C8B-B14F-4D97-AF65-F5344CB8AC3E}">
-        <p14:creationId xmlns:p14="http://schemas.microsoft.com/office/powerpoint/2010/main" val="2249065938"/>
+        <p14:creationId xmlns:p14="http://schemas.microsoft.com/office/powerpoint/2010/main" val="841790330"/>
       </p:ext>
     </p:extLst>
   </p:cSld>
@@ -11002,7 +11191,7 @@
     </p:spTree>
     <p:extLst>
       <p:ext uri="{BB962C8B-B14F-4D97-AF65-F5344CB8AC3E}">
-        <p14:creationId xmlns:p14="http://schemas.microsoft.com/office/powerpoint/2010/main" val="1447495885"/>
+        <p14:creationId xmlns:p14="http://schemas.microsoft.com/office/powerpoint/2010/main" val="967468312"/>
       </p:ext>
     </p:extLst>
   </p:cSld>
@@ -11626,7 +11815,7 @@
     </p:spTree>
     <p:extLst>
       <p:ext uri="{BB962C8B-B14F-4D97-AF65-F5344CB8AC3E}">
-        <p14:creationId xmlns:p14="http://schemas.microsoft.com/office/powerpoint/2010/main" val="709035613"/>
+        <p14:creationId xmlns:p14="http://schemas.microsoft.com/office/powerpoint/2010/main" val="232086399"/>
       </p:ext>
     </p:extLst>
   </p:cSld>
@@ -12492,7 +12681,7 @@
     </p:spTree>
     <p:extLst>
       <p:ext uri="{BB962C8B-B14F-4D97-AF65-F5344CB8AC3E}">
-        <p14:creationId xmlns:p14="http://schemas.microsoft.com/office/powerpoint/2010/main" val="413302494"/>
+        <p14:creationId xmlns:p14="http://schemas.microsoft.com/office/powerpoint/2010/main" val="2604818361"/>
       </p:ext>
     </p:extLst>
   </p:cSld>
@@ -12677,7 +12866,7 @@
     </p:spTree>
     <p:extLst>
       <p:ext uri="{BB962C8B-B14F-4D97-AF65-F5344CB8AC3E}">
-        <p14:creationId xmlns:p14="http://schemas.microsoft.com/office/powerpoint/2010/main" val="910538351"/>
+        <p14:creationId xmlns:p14="http://schemas.microsoft.com/office/powerpoint/2010/main" val="125950902"/>
       </p:ext>
     </p:extLst>
   </p:cSld>
@@ -13685,7 +13874,7 @@
     </p:spTree>
     <p:extLst>
       <p:ext uri="{BB962C8B-B14F-4D97-AF65-F5344CB8AC3E}">
-        <p14:creationId xmlns:p14="http://schemas.microsoft.com/office/powerpoint/2010/main" val="3966305280"/>
+        <p14:creationId xmlns:p14="http://schemas.microsoft.com/office/powerpoint/2010/main" val="2896776219"/>
       </p:ext>
     </p:extLst>
   </p:cSld>
@@ -13860,7 +14049,7 @@
     </p:spTree>
     <p:extLst>
       <p:ext uri="{BB962C8B-B14F-4D97-AF65-F5344CB8AC3E}">
-        <p14:creationId xmlns:p14="http://schemas.microsoft.com/office/powerpoint/2010/main" val="1678299420"/>
+        <p14:creationId xmlns:p14="http://schemas.microsoft.com/office/powerpoint/2010/main" val="696029158"/>
       </p:ext>
     </p:extLst>
   </p:cSld>
@@ -14930,7 +15119,7 @@
     </p:spTree>
     <p:extLst>
       <p:ext uri="{BB962C8B-B14F-4D97-AF65-F5344CB8AC3E}">
-        <p14:creationId xmlns:p14="http://schemas.microsoft.com/office/powerpoint/2010/main" val="3278991254"/>
+        <p14:creationId xmlns:p14="http://schemas.microsoft.com/office/powerpoint/2010/main" val="2926137983"/>
       </p:ext>
     </p:extLst>
   </p:cSld>
@@ -15166,7 +15355,7 @@
     </p:spTree>
     <p:extLst>
       <p:ext uri="{BB962C8B-B14F-4D97-AF65-F5344CB8AC3E}">
-        <p14:creationId xmlns:p14="http://schemas.microsoft.com/office/powerpoint/2010/main" val="2137131099"/>
+        <p14:creationId xmlns:p14="http://schemas.microsoft.com/office/powerpoint/2010/main" val="3009521796"/>
       </p:ext>
     </p:extLst>
   </p:cSld>
@@ -15576,7 +15765,7 @@
     </p:spTree>
     <p:extLst>
       <p:ext uri="{BB962C8B-B14F-4D97-AF65-F5344CB8AC3E}">
-        <p14:creationId xmlns:p14="http://schemas.microsoft.com/office/powerpoint/2010/main" val="2255656529"/>
+        <p14:creationId xmlns:p14="http://schemas.microsoft.com/office/powerpoint/2010/main" val="3289253747"/>
       </p:ext>
     </p:extLst>
   </p:cSld>
@@ -15703,7 +15892,7 @@
     </p:spTree>
     <p:extLst>
       <p:ext uri="{BB962C8B-B14F-4D97-AF65-F5344CB8AC3E}">
-        <p14:creationId xmlns:p14="http://schemas.microsoft.com/office/powerpoint/2010/main" val="1642224265"/>
+        <p14:creationId xmlns:p14="http://schemas.microsoft.com/office/powerpoint/2010/main" val="2130452446"/>
       </p:ext>
     </p:extLst>
   </p:cSld>
@@ -15834,7 +16023,7 @@
     </p:spTree>
     <p:extLst>
       <p:ext uri="{BB962C8B-B14F-4D97-AF65-F5344CB8AC3E}">
-        <p14:creationId xmlns:p14="http://schemas.microsoft.com/office/powerpoint/2010/main" val="119315319"/>
+        <p14:creationId xmlns:p14="http://schemas.microsoft.com/office/powerpoint/2010/main" val="2095865092"/>
       </p:ext>
     </p:extLst>
   </p:cSld>
@@ -16915,7 +17104,7 @@
     </p:spTree>
     <p:extLst>
       <p:ext uri="{BB962C8B-B14F-4D97-AF65-F5344CB8AC3E}">
-        <p14:creationId xmlns:p14="http://schemas.microsoft.com/office/powerpoint/2010/main" val="1524327443"/>
+        <p14:creationId xmlns:p14="http://schemas.microsoft.com/office/powerpoint/2010/main" val="2970279133"/>
       </p:ext>
     </p:extLst>
   </p:cSld>
@@ -18023,7 +18212,7 @@
     </p:spTree>
     <p:extLst>
       <p:ext uri="{BB962C8B-B14F-4D97-AF65-F5344CB8AC3E}">
-        <p14:creationId xmlns:p14="http://schemas.microsoft.com/office/powerpoint/2010/main" val="157964331"/>
+        <p14:creationId xmlns:p14="http://schemas.microsoft.com/office/powerpoint/2010/main" val="569331130"/>
       </p:ext>
     </p:extLst>
   </p:cSld>
@@ -19052,29 +19241,29 @@
     </p:spTree>
     <p:extLst>
       <p:ext uri="{BB962C8B-B14F-4D97-AF65-F5344CB8AC3E}">
-        <p14:creationId xmlns:p14="http://schemas.microsoft.com/office/powerpoint/2010/main" val="1614522098"/>
+        <p14:creationId xmlns:p14="http://schemas.microsoft.com/office/powerpoint/2010/main" val="3852658653"/>
       </p:ext>
     </p:extLst>
   </p:cSld>
   <p:clrMap bg1="lt1" tx1="dk1" bg2="lt2" tx2="dk2" accent1="accent1" accent2="accent2" accent3="accent3" accent4="accent4" accent5="accent5" accent6="accent6" hlink="hlink" folHlink="folHlink"/>
   <p:sldLayoutIdLst>
-    <p:sldLayoutId id="2147483769" r:id="rId1"/>
-    <p:sldLayoutId id="2147483770" r:id="rId2"/>
-    <p:sldLayoutId id="2147483771" r:id="rId3"/>
-    <p:sldLayoutId id="2147483772" r:id="rId4"/>
-    <p:sldLayoutId id="2147483773" r:id="rId5"/>
-    <p:sldLayoutId id="2147483774" r:id="rId6"/>
-    <p:sldLayoutId id="2147483775" r:id="rId7"/>
-    <p:sldLayoutId id="2147483776" r:id="rId8"/>
-    <p:sldLayoutId id="2147483777" r:id="rId9"/>
-    <p:sldLayoutId id="2147483778" r:id="rId10"/>
-    <p:sldLayoutId id="2147483779" r:id="rId11"/>
-    <p:sldLayoutId id="2147483780" r:id="rId12"/>
-    <p:sldLayoutId id="2147483781" r:id="rId13"/>
-    <p:sldLayoutId id="2147483782" r:id="rId14"/>
-    <p:sldLayoutId id="2147483783" r:id="rId15"/>
-    <p:sldLayoutId id="2147483784" r:id="rId16"/>
-    <p:sldLayoutId id="2147483785" r:id="rId17"/>
+    <p:sldLayoutId id="2147483901" r:id="rId1"/>
+    <p:sldLayoutId id="2147483902" r:id="rId2"/>
+    <p:sldLayoutId id="2147483903" r:id="rId3"/>
+    <p:sldLayoutId id="2147483904" r:id="rId4"/>
+    <p:sldLayoutId id="2147483905" r:id="rId5"/>
+    <p:sldLayoutId id="2147483906" r:id="rId6"/>
+    <p:sldLayoutId id="2147483907" r:id="rId7"/>
+    <p:sldLayoutId id="2147483908" r:id="rId8"/>
+    <p:sldLayoutId id="2147483909" r:id="rId9"/>
+    <p:sldLayoutId id="2147483910" r:id="rId10"/>
+    <p:sldLayoutId id="2147483911" r:id="rId11"/>
+    <p:sldLayoutId id="2147483912" r:id="rId12"/>
+    <p:sldLayoutId id="2147483913" r:id="rId13"/>
+    <p:sldLayoutId id="2147483914" r:id="rId14"/>
+    <p:sldLayoutId id="2147483915" r:id="rId15"/>
+    <p:sldLayoutId id="2147483916" r:id="rId16"/>
+    <p:sldLayoutId id="2147483917" r:id="rId17"/>
   </p:sldLayoutIdLst>
   <p:txStyles>
     <p:titleStyle>
@@ -19648,7 +19837,7 @@
         </p:nvGraphicFramePr>
         <p:xfrm>
           <a:off x="1155700" y="2603500"/>
-          <a:ext cx="8824912" cy="2199640"/>
+          <a:ext cx="8824913" cy="3416300"/>
         </p:xfrm>
         <a:graphic>
           <a:graphicData uri="http://schemas.openxmlformats.org/drawingml/2006/table">
@@ -21261,8 +21450,8 @@
         </p:blipFill>
         <p:spPr>
           <a:xfrm>
-            <a:off x="1386946" y="2422596"/>
-            <a:ext cx="9418107" cy="4435404"/>
+            <a:off x="1941082" y="2603500"/>
+            <a:ext cx="7254148" cy="3416300"/>
           </a:xfrm>
         </p:spPr>
       </p:pic>
@@ -22158,7 +22347,9 @@
         </p:nvSpPr>
         <p:spPr/>
         <p:txBody>
-          <a:bodyPr/>
+          <a:bodyPr>
+            <a:normAutofit/>
+          </a:bodyPr>
           <a:lstStyle/>
           <a:p>
             <a:r>
@@ -22664,8 +22855,8 @@
           </p:nvPr>
         </p:nvGraphicFramePr>
         <p:xfrm>
-          <a:off x="1154954" y="2603500"/>
-          <a:ext cx="8825659" cy="3416300"/>
+          <a:off x="1155700" y="2603500"/>
+          <a:ext cx="8824913" cy="3416300"/>
         </p:xfrm>
         <a:graphic>
           <a:graphicData uri="http://schemas.openxmlformats.org/drawingml/2006/diagram">

</xml_diff>